<commit_message>
2a versao do doc kickoff com logo coração
</commit_message>
<xml_diff>
--- a/PastaDocumetos/KickoffChallenge.pptx
+++ b/PastaDocumetos/KickoffChallenge.pptx
@@ -104,6 +104,11 @@
       </a:defRPr>
     </a:lvl9pPr>
   </p:defaultTextStyle>
+  <p:extLst>
+    <p:ext uri="{EFAFB233-063F-42B5-8137-9DF3F51BA10A}">
+      <p15:sldGuideLst xmlns:p15="http://schemas.microsoft.com/office/powerpoint/2012/main"/>
+    </p:ext>
+  </p:extLst>
 </p:presentation>
 </file>
 
@@ -3387,6 +3392,114 @@
           </a:p>
         </p:txBody>
       </p:sp>
+      <p:sp>
+        <p:nvSpPr>
+          <p:cNvPr id="5" name="Heart 4">
+            <a:extLst>
+              <a:ext uri="{FF2B5EF4-FFF2-40B4-BE49-F238E27FC236}">
+                <a16:creationId xmlns:a16="http://schemas.microsoft.com/office/drawing/2014/main" id="{0AD08AD5-4464-4301-9283-FE72DCE92493}"/>
+              </a:ext>
+            </a:extLst>
+          </p:cNvPr>
+          <p:cNvSpPr/>
+          <p:nvPr/>
+        </p:nvSpPr>
+        <p:spPr>
+          <a:xfrm>
+            <a:off x="3854548" y="4389120"/>
+            <a:ext cx="1730326" cy="1547446"/>
+          </a:xfrm>
+          <a:prstGeom prst="heart">
+            <a:avLst/>
+          </a:prstGeom>
+          <a:solidFill>
+            <a:srgbClr val="FF0000"/>
+          </a:solidFill>
+          <a:ln>
+            <a:solidFill>
+              <a:srgbClr val="FF0000"/>
+            </a:solidFill>
+          </a:ln>
+        </p:spPr>
+        <p:style>
+          <a:lnRef idx="2">
+            <a:schemeClr val="accent1">
+              <a:shade val="50000"/>
+            </a:schemeClr>
+          </a:lnRef>
+          <a:fillRef idx="1">
+            <a:schemeClr val="accent1"/>
+          </a:fillRef>
+          <a:effectRef idx="0">
+            <a:schemeClr val="accent1"/>
+          </a:effectRef>
+          <a:fontRef idx="minor">
+            <a:schemeClr val="lt1"/>
+          </a:fontRef>
+        </p:style>
+        <p:txBody>
+          <a:bodyPr rtlCol="0" anchor="ctr"/>
+          <a:lstStyle/>
+          <a:p>
+            <a:pPr algn="ctr"/>
+            <a:endParaRPr lang="en-US"/>
+          </a:p>
+        </p:txBody>
+      </p:sp>
+      <p:sp>
+        <p:nvSpPr>
+          <p:cNvPr id="6" name="Sun 5">
+            <a:extLst>
+              <a:ext uri="{FF2B5EF4-FFF2-40B4-BE49-F238E27FC236}">
+                <a16:creationId xmlns:a16="http://schemas.microsoft.com/office/drawing/2014/main" id="{00819BCC-2B4F-4146-A4EA-13595277E273}"/>
+              </a:ext>
+            </a:extLst>
+          </p:cNvPr>
+          <p:cNvSpPr/>
+          <p:nvPr/>
+        </p:nvSpPr>
+        <p:spPr>
+          <a:xfrm>
+            <a:off x="1266092" y="3249637"/>
+            <a:ext cx="2124222" cy="2124221"/>
+          </a:xfrm>
+          <a:prstGeom prst="sun">
+            <a:avLst/>
+          </a:prstGeom>
+          <a:solidFill>
+            <a:srgbClr val="FFFF00"/>
+          </a:solidFill>
+          <a:ln>
+            <a:solidFill>
+              <a:srgbClr val="FFFF00"/>
+            </a:solidFill>
+          </a:ln>
+        </p:spPr>
+        <p:style>
+          <a:lnRef idx="2">
+            <a:schemeClr val="accent1">
+              <a:shade val="50000"/>
+            </a:schemeClr>
+          </a:lnRef>
+          <a:fillRef idx="1">
+            <a:schemeClr val="accent1"/>
+          </a:fillRef>
+          <a:effectRef idx="0">
+            <a:schemeClr val="accent1"/>
+          </a:effectRef>
+          <a:fontRef idx="minor">
+            <a:schemeClr val="lt1"/>
+          </a:fontRef>
+        </p:style>
+        <p:txBody>
+          <a:bodyPr rtlCol="0" anchor="ctr"/>
+          <a:lstStyle/>
+          <a:p>
+            <a:pPr algn="ctr"/>
+            <a:endParaRPr lang="en-US"/>
+          </a:p>
+        </p:txBody>
+      </p:sp>
     </p:spTree>
     <p:extLst>
       <p:ext uri="{BB962C8B-B14F-4D97-AF65-F5344CB8AC3E}">

</xml_diff>